<commit_message>
Now you can add and remove many graphs
</commit_message>
<xml_diff>
--- a/misc/22 апреля.pptx
+++ b/misc/22 апреля.pptx
@@ -18,21 +18,21 @@
   <p:notesSz cx="6858000" cy="9144000"/>
   <p:embeddedFontLst>
     <p:embeddedFont>
-      <p:font typeface="Roboto" panose="020B0604020202020204" charset="0"/>
+      <p:font typeface="Montserrat" panose="020B0604020202020204" charset="-52"/>
       <p:regular r:id="rId8"/>
       <p:bold r:id="rId9"/>
       <p:italic r:id="rId10"/>
       <p:boldItalic r:id="rId11"/>
     </p:embeddedFont>
     <p:embeddedFont>
-      <p:font typeface="Montserrat" panose="020B0604020202020204" charset="-52"/>
+      <p:font typeface="Lato" panose="020B0604020202020204" charset="0"/>
       <p:regular r:id="rId12"/>
       <p:bold r:id="rId13"/>
       <p:italic r:id="rId14"/>
       <p:boldItalic r:id="rId15"/>
     </p:embeddedFont>
     <p:embeddedFont>
-      <p:font typeface="Lato" panose="020B0604020202020204" charset="0"/>
+      <p:font typeface="Roboto" panose="020B0604020202020204" charset="0"/>
       <p:regular r:id="rId16"/>
       <p:bold r:id="rId17"/>
       <p:italic r:id="rId18"/>
@@ -9725,15 +9725,132 @@
               <a:buNone/>
             </a:pPr>
             <a:r>
-              <a:rPr lang="ru" sz="1800">
+              <a:rPr lang="ru" sz="1800" dirty="0">
                 <a:latin typeface="Roboto"/>
                 <a:ea typeface="Roboto"/>
                 <a:cs typeface="Roboto"/>
                 <a:sym typeface="Roboto"/>
               </a:rPr>
-              <a:t>Расширение для Microsoft Visio - VSTO (C#)</a:t>
+              <a:t>Расширение для Microsoft Visio </a:t>
             </a:r>
-            <a:endParaRPr sz="1800">
+            <a:r>
+              <a:rPr lang="ru" sz="1800" dirty="0" smtClean="0">
+                <a:latin typeface="Roboto"/>
+                <a:ea typeface="Roboto"/>
+                <a:cs typeface="Roboto"/>
+                <a:sym typeface="Roboto"/>
+              </a:rPr>
+              <a:t>написано при помощи инструмента V</a:t>
+            </a:r>
+            <a:r>
+              <a:rPr lang="en-US" sz="1800" dirty="0" err="1" smtClean="0">
+                <a:latin typeface="Roboto"/>
+                <a:ea typeface="Roboto"/>
+                <a:cs typeface="Roboto"/>
+                <a:sym typeface="Roboto"/>
+              </a:rPr>
+              <a:t>isual</a:t>
+            </a:r>
+            <a:r>
+              <a:rPr lang="en-US" sz="1800" dirty="0" smtClean="0">
+                <a:latin typeface="Roboto"/>
+                <a:ea typeface="Roboto"/>
+                <a:cs typeface="Roboto"/>
+                <a:sym typeface="Roboto"/>
+              </a:rPr>
+              <a:t> </a:t>
+            </a:r>
+            <a:r>
+              <a:rPr lang="ru" sz="1800" dirty="0" smtClean="0">
+                <a:latin typeface="Roboto"/>
+                <a:ea typeface="Roboto"/>
+                <a:cs typeface="Roboto"/>
+                <a:sym typeface="Roboto"/>
+              </a:rPr>
+              <a:t>S</a:t>
+            </a:r>
+            <a:r>
+              <a:rPr lang="en-US" sz="1800" dirty="0" err="1" smtClean="0">
+                <a:latin typeface="Roboto"/>
+                <a:ea typeface="Roboto"/>
+                <a:cs typeface="Roboto"/>
+                <a:sym typeface="Roboto"/>
+              </a:rPr>
+              <a:t>tudio</a:t>
+            </a:r>
+            <a:r>
+              <a:rPr lang="en-US" sz="1800" dirty="0" smtClean="0">
+                <a:latin typeface="Roboto"/>
+                <a:ea typeface="Roboto"/>
+                <a:cs typeface="Roboto"/>
+                <a:sym typeface="Roboto"/>
+              </a:rPr>
+              <a:t> </a:t>
+            </a:r>
+            <a:r>
+              <a:rPr lang="ru" sz="1800" dirty="0" smtClean="0">
+                <a:latin typeface="Roboto"/>
+                <a:ea typeface="Roboto"/>
+                <a:cs typeface="Roboto"/>
+                <a:sym typeface="Roboto"/>
+              </a:rPr>
+              <a:t>T</a:t>
+            </a:r>
+            <a:r>
+              <a:rPr lang="en-US" sz="1800" dirty="0" err="1" smtClean="0">
+                <a:latin typeface="Roboto"/>
+                <a:ea typeface="Roboto"/>
+                <a:cs typeface="Roboto"/>
+                <a:sym typeface="Roboto"/>
+              </a:rPr>
+              <a:t>ools</a:t>
+            </a:r>
+            <a:r>
+              <a:rPr lang="en-US" sz="1800" dirty="0" smtClean="0">
+                <a:latin typeface="Roboto"/>
+                <a:ea typeface="Roboto"/>
+                <a:cs typeface="Roboto"/>
+                <a:sym typeface="Roboto"/>
+              </a:rPr>
+              <a:t> for </a:t>
+            </a:r>
+            <a:r>
+              <a:rPr lang="ru" sz="1800" dirty="0" smtClean="0">
+                <a:latin typeface="Roboto"/>
+                <a:ea typeface="Roboto"/>
+                <a:cs typeface="Roboto"/>
+                <a:sym typeface="Roboto"/>
+              </a:rPr>
+              <a:t>O</a:t>
+            </a:r>
+            <a:r>
+              <a:rPr lang="en-US" sz="1800" dirty="0" err="1" smtClean="0">
+                <a:latin typeface="Roboto"/>
+                <a:ea typeface="Roboto"/>
+                <a:cs typeface="Roboto"/>
+                <a:sym typeface="Roboto"/>
+              </a:rPr>
+              <a:t>ffice</a:t>
+            </a:r>
+            <a:r>
+              <a:rPr lang="ru" sz="1800" dirty="0" smtClean="0">
+                <a:latin typeface="Roboto"/>
+                <a:ea typeface="Roboto"/>
+                <a:cs typeface="Roboto"/>
+                <a:sym typeface="Roboto"/>
+              </a:rPr>
+              <a:t> </a:t>
+            </a:r>
+            <a:r>
+              <a:rPr lang="ru" sz="1800" dirty="0">
+                <a:latin typeface="Roboto"/>
+                <a:ea typeface="Roboto"/>
+                <a:cs typeface="Roboto"/>
+                <a:sym typeface="Roboto"/>
+              </a:rPr>
+              <a:t>(C#)</a:t>
+            </a:r>
+            <a:endParaRPr sz="1800" dirty="0">
               <a:latin typeface="Roboto"/>
               <a:ea typeface="Roboto"/>
               <a:cs typeface="Roboto"/>
@@ -9751,15 +9868,24 @@
               <a:buNone/>
             </a:pPr>
             <a:r>
-              <a:rPr lang="ru" sz="1800">
+              <a:rPr lang="ru" sz="1800" dirty="0">
                 <a:latin typeface="Roboto"/>
                 <a:ea typeface="Roboto"/>
                 <a:cs typeface="Roboto"/>
                 <a:sym typeface="Roboto"/>
               </a:rPr>
-              <a:t>Чтение DOT файла - Graphviz4Net + ANTLR</a:t>
+              <a:t>Чтение DOT файла </a:t>
             </a:r>
-            <a:endParaRPr sz="1800">
+            <a:r>
+              <a:rPr lang="ru" sz="1800" dirty="0" smtClean="0">
+                <a:latin typeface="Roboto"/>
+                <a:ea typeface="Roboto"/>
+                <a:cs typeface="Roboto"/>
+                <a:sym typeface="Roboto"/>
+              </a:rPr>
+              <a:t>осуществляется при помощи библиотеки Graphviz4Net, включающей в себя парсер ANTLR</a:t>
+            </a:r>
+            <a:endParaRPr sz="1800" dirty="0">
               <a:latin typeface="Roboto"/>
               <a:ea typeface="Roboto"/>
               <a:cs typeface="Roboto"/>
@@ -9944,7 +10070,16 @@
                 <a:cs typeface="Roboto"/>
                 <a:sym typeface="Roboto"/>
               </a:rPr>
-              <a:t>Краткосрочная перспектива:</a:t>
+              <a:t>Краткосрочная </a:t>
+            </a:r>
+            <a:r>
+              <a:rPr lang="ru-RU" dirty="0" smtClean="0">
+                <a:latin typeface="Roboto"/>
+                <a:ea typeface="Roboto"/>
+                <a:cs typeface="Roboto"/>
+                <a:sym typeface="Roboto"/>
+              </a:rPr>
+              <a:t>перспектива (до защиты):</a:t>
             </a:r>
             <a:endParaRPr lang="en-US" dirty="0" smtClean="0">
               <a:latin typeface="Roboto"/>
@@ -10178,16 +10313,7 @@
                 <a:cs typeface="Roboto"/>
                 <a:sym typeface="Roboto"/>
               </a:rPr>
-              <a:t>, чтоб не жаловался на использование ранее не </a:t>
-            </a:r>
-            <a:r>
-              <a:rPr lang="ru-RU" smtClean="0">
-                <a:latin typeface="Roboto"/>
-                <a:ea typeface="Roboto"/>
-                <a:cs typeface="Roboto"/>
-                <a:sym typeface="Roboto"/>
-              </a:rPr>
-              <a:t>объявленных вершин</a:t>
+              <a:t>, чтоб не жаловался на использование ранее не объявленных вершин</a:t>
             </a:r>
             <a:endParaRPr dirty="0">
               <a:latin typeface="Roboto"/>

</xml_diff>